<commit_message>
ISIS-1430: replace AuditingService with AuditerService.
</commit_message>
<xml_diff>
--- a/adocs/documentation/src/main/asciidoc/guides/images/reference-services/commands-and-events.pptx
+++ b/adocs/documentation/src/main/asciidoc/guides/images/reference-services/commands-and-events.pptx
@@ -243,7 +243,7 @@
           <a:p>
             <a:fld id="{F855B3F0-BB84-4743-96EB-565470B6C0EB}" type="datetimeFigureOut">
               <a:rPr lang="en-GB" smtClean="0"/>
-              <a:t>13/05/2016</a:t>
+              <a:t>06/06/2016</a:t>
             </a:fld>
             <a:endParaRPr lang="en-GB"/>
           </a:p>
@@ -413,7 +413,7 @@
           <a:p>
             <a:fld id="{F855B3F0-BB84-4743-96EB-565470B6C0EB}" type="datetimeFigureOut">
               <a:rPr lang="en-GB" smtClean="0"/>
-              <a:t>13/05/2016</a:t>
+              <a:t>06/06/2016</a:t>
             </a:fld>
             <a:endParaRPr lang="en-GB"/>
           </a:p>
@@ -593,7 +593,7 @@
           <a:p>
             <a:fld id="{F855B3F0-BB84-4743-96EB-565470B6C0EB}" type="datetimeFigureOut">
               <a:rPr lang="en-GB" smtClean="0"/>
-              <a:t>13/05/2016</a:t>
+              <a:t>06/06/2016</a:t>
             </a:fld>
             <a:endParaRPr lang="en-GB"/>
           </a:p>
@@ -763,7 +763,7 @@
           <a:p>
             <a:fld id="{F855B3F0-BB84-4743-96EB-565470B6C0EB}" type="datetimeFigureOut">
               <a:rPr lang="en-GB" smtClean="0"/>
-              <a:t>13/05/2016</a:t>
+              <a:t>06/06/2016</a:t>
             </a:fld>
             <a:endParaRPr lang="en-GB"/>
           </a:p>
@@ -1009,7 +1009,7 @@
           <a:p>
             <a:fld id="{F855B3F0-BB84-4743-96EB-565470B6C0EB}" type="datetimeFigureOut">
               <a:rPr lang="en-GB" smtClean="0"/>
-              <a:t>13/05/2016</a:t>
+              <a:t>06/06/2016</a:t>
             </a:fld>
             <a:endParaRPr lang="en-GB"/>
           </a:p>
@@ -1241,7 +1241,7 @@
           <a:p>
             <a:fld id="{F855B3F0-BB84-4743-96EB-565470B6C0EB}" type="datetimeFigureOut">
               <a:rPr lang="en-GB" smtClean="0"/>
-              <a:t>13/05/2016</a:t>
+              <a:t>06/06/2016</a:t>
             </a:fld>
             <a:endParaRPr lang="en-GB"/>
           </a:p>
@@ -1608,7 +1608,7 @@
           <a:p>
             <a:fld id="{F855B3F0-BB84-4743-96EB-565470B6C0EB}" type="datetimeFigureOut">
               <a:rPr lang="en-GB" smtClean="0"/>
-              <a:t>13/05/2016</a:t>
+              <a:t>06/06/2016</a:t>
             </a:fld>
             <a:endParaRPr lang="en-GB"/>
           </a:p>
@@ -1726,7 +1726,7 @@
           <a:p>
             <a:fld id="{F855B3F0-BB84-4743-96EB-565470B6C0EB}" type="datetimeFigureOut">
               <a:rPr lang="en-GB" smtClean="0"/>
-              <a:t>13/05/2016</a:t>
+              <a:t>06/06/2016</a:t>
             </a:fld>
             <a:endParaRPr lang="en-GB"/>
           </a:p>
@@ -1821,7 +1821,7 @@
           <a:p>
             <a:fld id="{F855B3F0-BB84-4743-96EB-565470B6C0EB}" type="datetimeFigureOut">
               <a:rPr lang="en-GB" smtClean="0"/>
-              <a:t>13/05/2016</a:t>
+              <a:t>06/06/2016</a:t>
             </a:fld>
             <a:endParaRPr lang="en-GB"/>
           </a:p>
@@ -2098,7 +2098,7 @@
           <a:p>
             <a:fld id="{F855B3F0-BB84-4743-96EB-565470B6C0EB}" type="datetimeFigureOut">
               <a:rPr lang="en-GB" smtClean="0"/>
-              <a:t>13/05/2016</a:t>
+              <a:t>06/06/2016</a:t>
             </a:fld>
             <a:endParaRPr lang="en-GB"/>
           </a:p>
@@ -2355,7 +2355,7 @@
           <a:p>
             <a:fld id="{F855B3F0-BB84-4743-96EB-565470B6C0EB}" type="datetimeFigureOut">
               <a:rPr lang="en-GB" smtClean="0"/>
-              <a:t>13/05/2016</a:t>
+              <a:t>06/06/2016</a:t>
             </a:fld>
             <a:endParaRPr lang="en-GB"/>
           </a:p>
@@ -2568,7 +2568,7 @@
           <a:p>
             <a:fld id="{F855B3F0-BB84-4743-96EB-565470B6C0EB}" type="datetimeFigureOut">
               <a:rPr lang="en-GB" smtClean="0"/>
-              <a:t>13/05/2016</a:t>
+              <a:t>06/06/2016</a:t>
             </a:fld>
             <a:endParaRPr lang="en-GB"/>
           </a:p>
@@ -2981,7 +2981,7 @@
         </p:nvSpPr>
         <p:spPr>
           <a:xfrm>
-            <a:off x="8280120" y="2509683"/>
+            <a:off x="8296353" y="3029112"/>
             <a:ext cx="1649759" cy="550678"/>
           </a:xfrm>
           <a:prstGeom prst="rect">
@@ -3165,19 +3165,17 @@
           </a:prstGeom>
         </p:spPr>
         <p:style>
-          <a:lnRef idx="2">
-            <a:schemeClr val="accent4">
-              <a:shade val="50000"/>
-            </a:schemeClr>
+          <a:lnRef idx="1">
+            <a:schemeClr val="dk1"/>
           </a:lnRef>
-          <a:fillRef idx="1">
-            <a:schemeClr val="accent4"/>
+          <a:fillRef idx="2">
+            <a:schemeClr val="dk1"/>
           </a:fillRef>
-          <a:effectRef idx="0">
-            <a:schemeClr val="accent4"/>
+          <a:effectRef idx="1">
+            <a:schemeClr val="dk1"/>
           </a:effectRef>
           <a:fontRef idx="minor">
-            <a:schemeClr val="lt1"/>
+            <a:schemeClr val="dk1"/>
           </a:fontRef>
         </p:style>
         <p:txBody>
@@ -3186,20 +3184,37 @@
           <a:p>
             <a:pPr algn="ctr"/>
             <a:r>
-              <a:rPr lang="en-GB" sz="1600" dirty="0"/>
+              <a:rPr lang="en-GB" sz="1600" dirty="0">
+                <a:solidFill>
+                  <a:schemeClr val="bg1"/>
+                </a:solidFill>
+              </a:rPr>
               <a:t>Command</a:t>
             </a:r>
           </a:p>
           <a:p>
             <a:pPr algn="ctr"/>
-            <a:endParaRPr lang="en-GB" sz="1600" dirty="0"/>
+            <a:endParaRPr lang="en-GB" sz="1600" dirty="0">
+              <a:solidFill>
+                <a:schemeClr val="bg1"/>
+              </a:solidFill>
+            </a:endParaRPr>
           </a:p>
           <a:p>
             <a:pPr algn="ctr"/>
             <a:r>
-              <a:rPr lang="en-GB" sz="1600" dirty="0"/>
+              <a:rPr lang="en-GB" sz="1200" dirty="0">
+                <a:solidFill>
+                  <a:schemeClr val="bg1"/>
+                </a:solidFill>
+              </a:rPr>
               <a:t>(intention to execute)</a:t>
             </a:r>
+            <a:endParaRPr lang="en-GB" sz="1100" dirty="0">
+              <a:solidFill>
+                <a:schemeClr val="bg1"/>
+              </a:solidFill>
+            </a:endParaRPr>
           </a:p>
         </p:txBody>
       </p:sp>
@@ -3258,16 +3273,24 @@
           <a:p>
             <a:pPr algn="ctr"/>
             <a:r>
-              <a:rPr lang="en-GB" sz="1400" dirty="0"/>
-              <a:t>action invocation or</a:t>
+              <a:rPr lang="en-GB" sz="1200" dirty="0"/>
+              <a:t>action invocation</a:t>
             </a:r>
             <a:br>
-              <a:rPr lang="en-GB" sz="1400" dirty="0"/>
+              <a:rPr lang="en-GB" sz="1200" dirty="0"/>
             </a:br>
             <a:r>
-              <a:rPr lang="en-GB" sz="1400" dirty="0"/>
+              <a:rPr lang="en-GB" sz="1200" dirty="0"/>
+              <a:t>or</a:t>
+            </a:r>
+            <a:br>
+              <a:rPr lang="en-GB" sz="1200" dirty="0"/>
+            </a:br>
+            <a:r>
+              <a:rPr lang="en-GB" sz="1200" dirty="0"/>
               <a:t>property edit</a:t>
             </a:r>
+            <a:endParaRPr lang="en-GB" sz="1400" dirty="0"/>
           </a:p>
         </p:txBody>
       </p:sp>
@@ -3841,8 +3864,8 @@
         </p:nvSpPr>
         <p:spPr>
           <a:xfrm>
-            <a:off x="6291319" y="2015255"/>
-            <a:ext cx="1569187" cy="550678"/>
+            <a:off x="6150646" y="2126854"/>
+            <a:ext cx="1569187" cy="500616"/>
           </a:xfrm>
           <a:prstGeom prst="rect">
             <a:avLst/>
@@ -3900,7 +3923,7 @@
         </p:nvSpPr>
         <p:spPr>
           <a:xfrm>
-            <a:off x="6323877" y="117570"/>
+            <a:off x="6150646" y="113217"/>
             <a:ext cx="1633864" cy="550678"/>
           </a:xfrm>
           <a:prstGeom prst="rect">
@@ -3928,7 +3951,7 @@
             <a:r>
               <a:rPr lang="en-GB" sz="1600" i="1" dirty="0">
                 <a:solidFill>
-                  <a:schemeClr val="tx1"/>
+                  <a:schemeClr val="accent4"/>
                 </a:solidFill>
               </a:rPr>
               <a:t>Auditing</a:t>
@@ -3936,21 +3959,21 @@
             <a:br>
               <a:rPr lang="en-GB" sz="1600" i="1" dirty="0">
                 <a:solidFill>
-                  <a:schemeClr val="tx1"/>
+                  <a:schemeClr val="accent4"/>
                 </a:solidFill>
               </a:rPr>
             </a:br>
             <a:r>
               <a:rPr lang="en-GB" sz="1600" i="1" dirty="0" err="1">
                 <a:solidFill>
-                  <a:schemeClr val="tx1"/>
+                  <a:schemeClr val="accent4"/>
                 </a:solidFill>
               </a:rPr>
               <a:t>ServiceInternal</a:t>
             </a:r>
             <a:endParaRPr lang="en-GB" sz="1600" i="1" dirty="0">
               <a:solidFill>
-                <a:schemeClr val="tx1"/>
+                <a:schemeClr val="accent4"/>
               </a:solidFill>
             </a:endParaRPr>
           </a:p>
@@ -3964,7 +3987,7 @@
         </p:nvSpPr>
         <p:spPr>
           <a:xfrm>
-            <a:off x="8204500" y="2420103"/>
+            <a:off x="8220733" y="2939532"/>
             <a:ext cx="1649759" cy="550678"/>
           </a:xfrm>
           <a:prstGeom prst="rect">
@@ -4056,14 +4079,18 @@
             <a:r>
               <a:rPr lang="en-GB" sz="1600" dirty="0" err="1">
                 <a:solidFill>
-                  <a:schemeClr val="accent4"/>
+                  <a:schemeClr val="bg1">
+                    <a:lumMod val="50000"/>
+                  </a:schemeClr>
                 </a:solidFill>
               </a:rPr>
               <a:t>CommandContext</a:t>
             </a:r>
             <a:endParaRPr lang="en-GB" sz="1600" dirty="0">
               <a:solidFill>
-                <a:schemeClr val="accent4"/>
+                <a:schemeClr val="bg1">
+                  <a:lumMod val="50000"/>
+                </a:schemeClr>
               </a:solidFill>
             </a:endParaRPr>
           </a:p>
@@ -4119,8 +4146,8 @@
         </p:nvCxnSpPr>
         <p:spPr>
           <a:xfrm flipV="1">
-            <a:off x="3569604" y="2290594"/>
-            <a:ext cx="2721715" cy="333388"/>
+            <a:off x="3590682" y="2377162"/>
+            <a:ext cx="2559964" cy="206846"/>
           </a:xfrm>
           <a:prstGeom prst="curvedConnector3">
             <a:avLst>
@@ -4162,8 +4189,8 @@
         </p:nvCxnSpPr>
         <p:spPr>
           <a:xfrm flipV="1">
-            <a:off x="5631658" y="2290594"/>
-            <a:ext cx="659658" cy="616248"/>
+            <a:off x="5648724" y="2377162"/>
+            <a:ext cx="501922" cy="451221"/>
           </a:xfrm>
           <a:prstGeom prst="curvedConnector3">
             <a:avLst>
@@ -4205,8 +4232,8 @@
         </p:nvCxnSpPr>
         <p:spPr>
           <a:xfrm>
-            <a:off x="5873769" y="1023221"/>
-            <a:ext cx="1202142" cy="992037"/>
+            <a:off x="5627771" y="1177175"/>
+            <a:ext cx="1307469" cy="949679"/>
           </a:xfrm>
           <a:prstGeom prst="curvedConnector2">
             <a:avLst/>
@@ -4244,7 +4271,7 @@
         </p:nvSpPr>
         <p:spPr>
           <a:xfrm>
-            <a:off x="6274916" y="2623983"/>
+            <a:off x="6069311" y="2623983"/>
             <a:ext cx="1494320" cy="600164"/>
           </a:xfrm>
           <a:prstGeom prst="rect">
@@ -4304,7 +4331,7 @@
         </p:nvSpPr>
         <p:spPr>
           <a:xfrm>
-            <a:off x="6670683" y="1198229"/>
+            <a:off x="6530010" y="1317269"/>
             <a:ext cx="1721946" cy="430887"/>
           </a:xfrm>
           <a:prstGeom prst="rect">
@@ -4338,7 +4365,7 @@
             </a:br>
             <a:r>
               <a:rPr lang="en-GB" sz="1100" dirty="0"/>
-              <a:t>at end of interaction</a:t>
+              <a:t>at end of transaction</a:t>
             </a:r>
           </a:p>
         </p:txBody>
@@ -4354,17 +4381,15 @@
         </p:nvCxnSpPr>
         <p:spPr>
           <a:xfrm flipV="1">
-            <a:off x="5631660" y="668248"/>
-            <a:ext cx="1509151" cy="354970"/>
+            <a:off x="5631660" y="663895"/>
+            <a:ext cx="1335918" cy="359326"/>
           </a:xfrm>
           <a:prstGeom prst="curvedConnector2">
             <a:avLst/>
           </a:prstGeom>
           <a:ln w="19050">
             <a:solidFill>
-              <a:schemeClr val="accent4">
-                <a:lumMod val="75000"/>
-              </a:schemeClr>
+              <a:schemeClr val="accent4"/>
             </a:solidFill>
             <a:prstDash val="sysDash"/>
             <a:tailEnd type="triangle"/>
@@ -4393,8 +4418,8 @@
         </p:nvSpPr>
         <p:spPr>
           <a:xfrm>
-            <a:off x="6704210" y="793394"/>
-            <a:ext cx="1981633" cy="430887"/>
+            <a:off x="6530010" y="818069"/>
+            <a:ext cx="1515158" cy="430887"/>
           </a:xfrm>
           <a:prstGeom prst="rect">
             <a:avLst/>
@@ -4408,15 +4433,27 @@
           <a:lstStyle/>
           <a:p>
             <a:r>
-              <a:rPr lang="en-GB" sz="1100" dirty="0"/>
-              <a:t>audit all changed</a:t>
+              <a:rPr lang="en-GB" sz="1100" dirty="0">
+                <a:solidFill>
+                  <a:schemeClr val="accent4"/>
+                </a:solidFill>
+              </a:rPr>
+              <a:t>audit all changed props</a:t>
             </a:r>
             <a:br>
-              <a:rPr lang="en-GB" sz="1100" dirty="0"/>
+              <a:rPr lang="en-GB" sz="1100" dirty="0">
+                <a:solidFill>
+                  <a:schemeClr val="accent4"/>
+                </a:solidFill>
+              </a:rPr>
             </a:br>
             <a:r>
-              <a:rPr lang="en-GB" sz="1100" dirty="0"/>
-              <a:t>properties at end of interaction</a:t>
+              <a:rPr lang="en-GB" sz="1100" dirty="0">
+                <a:solidFill>
+                  <a:schemeClr val="accent4"/>
+                </a:solidFill>
+              </a:rPr>
+              <a:t>at end of transaction</a:t>
             </a:r>
           </a:p>
         </p:txBody>
@@ -4489,7 +4526,7 @@
         </p:nvSpPr>
         <p:spPr>
           <a:xfrm>
-            <a:off x="8204498" y="113217"/>
+            <a:off x="8220731" y="113217"/>
             <a:ext cx="1649759" cy="550678"/>
           </a:xfrm>
           <a:prstGeom prst="rect">
@@ -4552,8 +4589,8 @@
         </p:nvCxnSpPr>
         <p:spPr>
           <a:xfrm>
-            <a:off x="7860506" y="2290594"/>
-            <a:ext cx="343994" cy="404848"/>
+            <a:off x="7719833" y="2377162"/>
+            <a:ext cx="500900" cy="837709"/>
           </a:xfrm>
           <a:prstGeom prst="curvedConnector3">
             <a:avLst>
@@ -4595,9 +4632,9 @@
           <p:nvPr/>
         </p:nvCxnSpPr>
         <p:spPr>
-          <a:xfrm flipV="1">
-            <a:off x="7957744" y="388559"/>
-            <a:ext cx="246755" cy="4353"/>
+          <a:xfrm>
+            <a:off x="7784510" y="388556"/>
+            <a:ext cx="436221" cy="12700"/>
           </a:xfrm>
           <a:prstGeom prst="curvedConnector3">
             <a:avLst>
@@ -4825,8 +4862,8 @@
         </p:nvSpPr>
         <p:spPr>
           <a:xfrm>
-            <a:off x="3744251" y="3242149"/>
-            <a:ext cx="694421" cy="600164"/>
+            <a:off x="3767495" y="3236738"/>
+            <a:ext cx="647933" cy="553998"/>
           </a:xfrm>
           <a:prstGeom prst="rect">
             <a:avLst/>
@@ -4841,21 +4878,21 @@
           <a:p>
             <a:pPr algn="ctr"/>
             <a:r>
-              <a:rPr lang="en-GB" sz="1100" dirty="0"/>
+              <a:rPr lang="en-GB" sz="1000" dirty="0"/>
               <a:t>via</a:t>
             </a:r>
             <a:br>
-              <a:rPr lang="en-GB" sz="1100" dirty="0"/>
+              <a:rPr lang="en-GB" sz="1000" dirty="0"/>
             </a:br>
             <a:r>
-              <a:rPr lang="en-GB" sz="1100" dirty="0"/>
+              <a:rPr lang="en-GB" sz="1000" dirty="0"/>
               <a:t>Wrapper</a:t>
             </a:r>
             <a:br>
-              <a:rPr lang="en-GB" sz="1100" dirty="0"/>
+              <a:rPr lang="en-GB" sz="1000" dirty="0"/>
             </a:br>
             <a:r>
-              <a:rPr lang="en-GB" sz="1100" dirty="0"/>
+              <a:rPr lang="en-GB" sz="1000" dirty="0"/>
               <a:t>Factory</a:t>
             </a:r>
           </a:p>
@@ -5013,7 +5050,7 @@
         </p:nvSpPr>
         <p:spPr>
           <a:xfrm>
-            <a:off x="8204498" y="1598442"/>
+            <a:off x="8220731" y="2117871"/>
             <a:ext cx="1649759" cy="550678"/>
           </a:xfrm>
           <a:prstGeom prst="rect">
@@ -5076,9 +5113,9 @@
           <p:nvPr/>
         </p:nvCxnSpPr>
         <p:spPr>
-          <a:xfrm flipV="1">
-            <a:off x="7860506" y="1873781"/>
-            <a:ext cx="343992" cy="416813"/>
+          <a:xfrm>
+            <a:off x="7719833" y="2377162"/>
+            <a:ext cx="500898" cy="16048"/>
           </a:xfrm>
           <a:prstGeom prst="curvedConnector3">
             <a:avLst>
@@ -5088,6 +5125,153 @@
           <a:ln w="19050">
             <a:solidFill>
               <a:schemeClr val="accent2">
+                <a:lumMod val="75000"/>
+              </a:schemeClr>
+            </a:solidFill>
+            <a:prstDash val="sysDash"/>
+            <a:tailEnd type="triangle"/>
+          </a:ln>
+        </p:spPr>
+        <p:style>
+          <a:lnRef idx="1">
+            <a:schemeClr val="accent1"/>
+          </a:lnRef>
+          <a:fillRef idx="0">
+            <a:schemeClr val="accent1"/>
+          </a:fillRef>
+          <a:effectRef idx="0">
+            <a:schemeClr val="accent1"/>
+          </a:effectRef>
+          <a:fontRef idx="minor">
+            <a:schemeClr val="tx1"/>
+          </a:fontRef>
+        </p:style>
+      </p:cxnSp>
+      <p:sp>
+        <p:nvSpPr>
+          <p:cNvPr id="47" name="Rectangle 46"/>
+          <p:cNvSpPr/>
+          <p:nvPr/>
+        </p:nvSpPr>
+        <p:spPr>
+          <a:xfrm>
+            <a:off x="8296351" y="875901"/>
+            <a:ext cx="1649759" cy="550678"/>
+          </a:xfrm>
+          <a:prstGeom prst="rect">
+            <a:avLst/>
+          </a:prstGeom>
+        </p:spPr>
+        <p:style>
+          <a:lnRef idx="1">
+            <a:schemeClr val="accent3"/>
+          </a:lnRef>
+          <a:fillRef idx="2">
+            <a:schemeClr val="accent3"/>
+          </a:fillRef>
+          <a:effectRef idx="1">
+            <a:schemeClr val="accent3"/>
+          </a:effectRef>
+          <a:fontRef idx="minor">
+            <a:schemeClr val="dk1"/>
+          </a:fontRef>
+        </p:style>
+        <p:txBody>
+          <a:bodyPr rtlCol="0" anchor="t" anchorCtr="0"/>
+          <a:lstStyle/>
+          <a:p>
+            <a:pPr algn="ctr"/>
+            <a:endParaRPr lang="en-GB" sz="1600" dirty="0">
+              <a:solidFill>
+                <a:schemeClr val="tx1"/>
+              </a:solidFill>
+            </a:endParaRPr>
+          </a:p>
+        </p:txBody>
+      </p:sp>
+      <p:sp>
+        <p:nvSpPr>
+          <p:cNvPr id="49" name="Rectangle 48"/>
+          <p:cNvSpPr/>
+          <p:nvPr/>
+        </p:nvSpPr>
+        <p:spPr>
+          <a:xfrm>
+            <a:off x="8220731" y="786321"/>
+            <a:ext cx="1649759" cy="550678"/>
+          </a:xfrm>
+          <a:prstGeom prst="rect">
+            <a:avLst/>
+          </a:prstGeom>
+        </p:spPr>
+        <p:style>
+          <a:lnRef idx="1">
+            <a:schemeClr val="accent3"/>
+          </a:lnRef>
+          <a:fillRef idx="2">
+            <a:schemeClr val="accent3"/>
+          </a:fillRef>
+          <a:effectRef idx="1">
+            <a:schemeClr val="accent3"/>
+          </a:effectRef>
+          <a:fontRef idx="minor">
+            <a:schemeClr val="dk1"/>
+          </a:fontRef>
+        </p:style>
+        <p:txBody>
+          <a:bodyPr rtlCol="0" anchor="t" anchorCtr="0"/>
+          <a:lstStyle/>
+          <a:p>
+            <a:pPr algn="ctr"/>
+            <a:r>
+              <a:rPr lang="en-GB" sz="1600" dirty="0" err="1">
+                <a:solidFill>
+                  <a:schemeClr val="tx1"/>
+                </a:solidFill>
+              </a:rPr>
+              <a:t>AuditerService</a:t>
+            </a:r>
+            <a:endParaRPr lang="en-GB" sz="1600" dirty="0">
+              <a:solidFill>
+                <a:schemeClr val="tx1"/>
+              </a:solidFill>
+            </a:endParaRPr>
+          </a:p>
+          <a:p>
+            <a:pPr algn="ctr"/>
+            <a:r>
+              <a:rPr lang="en-GB" sz="1600" dirty="0">
+                <a:solidFill>
+                  <a:schemeClr val="tx1"/>
+                </a:solidFill>
+              </a:rPr>
+              <a:t>SPI</a:t>
+            </a:r>
+          </a:p>
+        </p:txBody>
+      </p:sp>
+      <p:cxnSp>
+        <p:nvCxnSpPr>
+          <p:cNvPr id="50" name="Curved Connector 49"/>
+          <p:cNvCxnSpPr>
+            <a:stCxn id="101" idx="3"/>
+            <a:endCxn id="49" idx="1"/>
+          </p:cNvCxnSpPr>
+          <p:nvPr/>
+        </p:nvCxnSpPr>
+        <p:spPr>
+          <a:xfrm>
+            <a:off x="7784510" y="388556"/>
+            <a:ext cx="436221" cy="673104"/>
+          </a:xfrm>
+          <a:prstGeom prst="curvedConnector3">
+            <a:avLst>
+              <a:gd name="adj1" fmla="val 50000"/>
+            </a:avLst>
+          </a:prstGeom>
+          <a:ln w="19050">
+            <a:solidFill>
+              <a:schemeClr val="accent4">
                 <a:lumMod val="75000"/>
               </a:schemeClr>
             </a:solidFill>

</xml_diff>